<commit_message>
Update Diagrama de Clases Juego de ajedrez.pptx
</commit_message>
<xml_diff>
--- a/clase 2/diagrama de clases/Diagrama de Clases Juego de ajedrez.pptx
+++ b/clase 2/diagrama de clases/Diagrama de Clases Juego de ajedrez.pptx
@@ -6,6 +6,9 @@
   </p:sldMasterIdLst>
   <p:sldIdLst>
     <p:sldId id="256" r:id="rId2"/>
+    <p:sldId id="259" r:id="rId3"/>
+    <p:sldId id="257" r:id="rId4"/>
+    <p:sldId id="258" r:id="rId5"/>
   </p:sldIdLst>
   <p:sldSz cx="12192000" cy="6858000"/>
   <p:notesSz cx="6858000" cy="9144000"/>
@@ -104,6 +107,11 @@
       </a:defRPr>
     </a:lvl9pPr>
   </p:defaultTextStyle>
+  <p:extLst>
+    <p:ext uri="{EFAFB233-063F-42B5-8137-9DF3F51BA10A}">
+      <p15:sldGuideLst xmlns:p15="http://schemas.microsoft.com/office/powerpoint/2012/main"/>
+    </p:ext>
+  </p:extLst>
 </p:presentation>
 </file>
 
@@ -238,7 +246,7 @@
           <a:p>
             <a:fld id="{2F349187-6CB4-48FC-9492-D674D1F2BF3B}" type="datetimeFigureOut">
               <a:rPr lang="es-CO" smtClean="0"/>
-              <a:t>4/07/2021</a:t>
+              <a:t>9/07/2021</a:t>
             </a:fld>
             <a:endParaRPr lang="es-CO"/>
           </a:p>
@@ -408,7 +416,7 @@
           <a:p>
             <a:fld id="{2F349187-6CB4-48FC-9492-D674D1F2BF3B}" type="datetimeFigureOut">
               <a:rPr lang="es-CO" smtClean="0"/>
-              <a:t>4/07/2021</a:t>
+              <a:t>9/07/2021</a:t>
             </a:fld>
             <a:endParaRPr lang="es-CO"/>
           </a:p>
@@ -588,7 +596,7 @@
           <a:p>
             <a:fld id="{2F349187-6CB4-48FC-9492-D674D1F2BF3B}" type="datetimeFigureOut">
               <a:rPr lang="es-CO" smtClean="0"/>
-              <a:t>4/07/2021</a:t>
+              <a:t>9/07/2021</a:t>
             </a:fld>
             <a:endParaRPr lang="es-CO"/>
           </a:p>
@@ -758,7 +766,7 @@
           <a:p>
             <a:fld id="{2F349187-6CB4-48FC-9492-D674D1F2BF3B}" type="datetimeFigureOut">
               <a:rPr lang="es-CO" smtClean="0"/>
-              <a:t>4/07/2021</a:t>
+              <a:t>9/07/2021</a:t>
             </a:fld>
             <a:endParaRPr lang="es-CO"/>
           </a:p>
@@ -1004,7 +1012,7 @@
           <a:p>
             <a:fld id="{2F349187-6CB4-48FC-9492-D674D1F2BF3B}" type="datetimeFigureOut">
               <a:rPr lang="es-CO" smtClean="0"/>
-              <a:t>4/07/2021</a:t>
+              <a:t>9/07/2021</a:t>
             </a:fld>
             <a:endParaRPr lang="es-CO"/>
           </a:p>
@@ -1236,7 +1244,7 @@
           <a:p>
             <a:fld id="{2F349187-6CB4-48FC-9492-D674D1F2BF3B}" type="datetimeFigureOut">
               <a:rPr lang="es-CO" smtClean="0"/>
-              <a:t>4/07/2021</a:t>
+              <a:t>9/07/2021</a:t>
             </a:fld>
             <a:endParaRPr lang="es-CO"/>
           </a:p>
@@ -1603,7 +1611,7 @@
           <a:p>
             <a:fld id="{2F349187-6CB4-48FC-9492-D674D1F2BF3B}" type="datetimeFigureOut">
               <a:rPr lang="es-CO" smtClean="0"/>
-              <a:t>4/07/2021</a:t>
+              <a:t>9/07/2021</a:t>
             </a:fld>
             <a:endParaRPr lang="es-CO"/>
           </a:p>
@@ -1721,7 +1729,7 @@
           <a:p>
             <a:fld id="{2F349187-6CB4-48FC-9492-D674D1F2BF3B}" type="datetimeFigureOut">
               <a:rPr lang="es-CO" smtClean="0"/>
-              <a:t>4/07/2021</a:t>
+              <a:t>9/07/2021</a:t>
             </a:fld>
             <a:endParaRPr lang="es-CO"/>
           </a:p>
@@ -1816,7 +1824,7 @@
           <a:p>
             <a:fld id="{2F349187-6CB4-48FC-9492-D674D1F2BF3B}" type="datetimeFigureOut">
               <a:rPr lang="es-CO" smtClean="0"/>
-              <a:t>4/07/2021</a:t>
+              <a:t>9/07/2021</a:t>
             </a:fld>
             <a:endParaRPr lang="es-CO"/>
           </a:p>
@@ -2093,7 +2101,7 @@
           <a:p>
             <a:fld id="{2F349187-6CB4-48FC-9492-D674D1F2BF3B}" type="datetimeFigureOut">
               <a:rPr lang="es-CO" smtClean="0"/>
-              <a:t>4/07/2021</a:t>
+              <a:t>9/07/2021</a:t>
             </a:fld>
             <a:endParaRPr lang="es-CO"/>
           </a:p>
@@ -2346,7 +2354,7 @@
           <a:p>
             <a:fld id="{2F349187-6CB4-48FC-9492-D674D1F2BF3B}" type="datetimeFigureOut">
               <a:rPr lang="es-CO" smtClean="0"/>
-              <a:t>4/07/2021</a:t>
+              <a:t>9/07/2021</a:t>
             </a:fld>
             <a:endParaRPr lang="es-CO"/>
           </a:p>
@@ -2559,7 +2567,7 @@
           <a:p>
             <a:fld id="{2F349187-6CB4-48FC-9492-D674D1F2BF3B}" type="datetimeFigureOut">
               <a:rPr lang="es-CO" smtClean="0"/>
-              <a:t>4/07/2021</a:t>
+              <a:t>9/07/2021</a:t>
             </a:fld>
             <a:endParaRPr lang="es-CO"/>
           </a:p>
@@ -5131,6 +5139,206 @@
 </p:sld>
 </file>
 
+<file path=ppt/slides/slide2.xml><?xml version="1.0" encoding="utf-8"?>
+<p:sld xmlns:a="http://schemas.openxmlformats.org/drawingml/2006/main" xmlns:r="http://schemas.openxmlformats.org/officeDocument/2006/relationships" xmlns:p="http://schemas.openxmlformats.org/presentationml/2006/main">
+  <p:cSld>
+    <p:spTree>
+      <p:nvGrpSpPr>
+        <p:cNvPr id="1" name=""/>
+        <p:cNvGrpSpPr/>
+        <p:nvPr/>
+      </p:nvGrpSpPr>
+      <p:grpSpPr>
+        <a:xfrm>
+          <a:off x="0" y="0"/>
+          <a:ext cx="0" cy="0"/>
+          <a:chOff x="0" y="0"/>
+          <a:chExt cx="0" cy="0"/>
+        </a:xfrm>
+      </p:grpSpPr>
+      <p:sp>
+        <p:nvSpPr>
+          <p:cNvPr id="2" name="Título 1"/>
+          <p:cNvSpPr>
+            <a:spLocks noGrp="1"/>
+          </p:cNvSpPr>
+          <p:nvPr>
+            <p:ph type="title"/>
+          </p:nvPr>
+        </p:nvSpPr>
+        <p:spPr/>
+        <p:txBody>
+          <a:bodyPr/>
+          <a:lstStyle/>
+          <a:p>
+            <a:r>
+              <a:rPr lang="es-ES" dirty="0" smtClean="0"/>
+              <a:t>Diagrama de clases empresa</a:t>
+            </a:r>
+            <a:endParaRPr lang="es-CO" dirty="0"/>
+          </a:p>
+        </p:txBody>
+      </p:sp>
+      <p:sp>
+        <p:nvSpPr>
+          <p:cNvPr id="4" name="Rectángulo 3"/>
+          <p:cNvSpPr/>
+          <p:nvPr/>
+        </p:nvSpPr>
+        <p:spPr>
+          <a:xfrm>
+            <a:off x="623455" y="1911927"/>
+            <a:ext cx="1392381" cy="1122218"/>
+          </a:xfrm>
+          <a:prstGeom prst="rect">
+            <a:avLst/>
+          </a:prstGeom>
+          <a:noFill/>
+        </p:spPr>
+        <p:style>
+          <a:lnRef idx="2">
+            <a:schemeClr val="accent1">
+              <a:shade val="50000"/>
+            </a:schemeClr>
+          </a:lnRef>
+          <a:fillRef idx="1">
+            <a:schemeClr val="accent1"/>
+          </a:fillRef>
+          <a:effectRef idx="0">
+            <a:schemeClr val="accent1"/>
+          </a:effectRef>
+          <a:fontRef idx="minor">
+            <a:schemeClr val="lt1"/>
+          </a:fontRef>
+        </p:style>
+        <p:txBody>
+          <a:bodyPr rtlCol="0" anchor="ctr"/>
+          <a:lstStyle/>
+          <a:p>
+            <a:pPr algn="ctr"/>
+            <a:endParaRPr lang="es-CO"/>
+          </a:p>
+        </p:txBody>
+      </p:sp>
+    </p:spTree>
+    <p:extLst>
+      <p:ext uri="{BB962C8B-B14F-4D97-AF65-F5344CB8AC3E}">
+        <p14:creationId xmlns:p14="http://schemas.microsoft.com/office/powerpoint/2010/main" val="1336742981"/>
+      </p:ext>
+    </p:extLst>
+  </p:cSld>
+  <p:clrMapOvr>
+    <a:masterClrMapping/>
+  </p:clrMapOvr>
+</p:sld>
+</file>
+
+<file path=ppt/slides/slide3.xml><?xml version="1.0" encoding="utf-8"?>
+<p:sld xmlns:a="http://schemas.openxmlformats.org/drawingml/2006/main" xmlns:r="http://schemas.openxmlformats.org/officeDocument/2006/relationships" xmlns:p="http://schemas.openxmlformats.org/presentationml/2006/main">
+  <p:cSld>
+    <p:spTree>
+      <p:nvGrpSpPr>
+        <p:cNvPr id="1" name=""/>
+        <p:cNvGrpSpPr/>
+        <p:nvPr/>
+      </p:nvGrpSpPr>
+      <p:grpSpPr>
+        <a:xfrm>
+          <a:off x="0" y="0"/>
+          <a:ext cx="0" cy="0"/>
+          <a:chOff x="0" y="0"/>
+          <a:chExt cx="0" cy="0"/>
+        </a:xfrm>
+      </p:grpSpPr>
+      <p:pic>
+        <p:nvPicPr>
+          <p:cNvPr id="4" name="Imagen 3"/>
+          <p:cNvPicPr>
+            <a:picLocks noChangeAspect="1"/>
+          </p:cNvPicPr>
+          <p:nvPr/>
+        </p:nvPicPr>
+        <p:blipFill rotWithShape="1">
+          <a:blip r:embed="rId2"/>
+          <a:srcRect l="14542" t="16548" r="8333" b="7228"/>
+          <a:stretch/>
+        </p:blipFill>
+        <p:spPr>
+          <a:xfrm>
+            <a:off x="940158" y="631065"/>
+            <a:ext cx="10612696" cy="6555346"/>
+          </a:xfrm>
+          <a:prstGeom prst="rect">
+            <a:avLst/>
+          </a:prstGeom>
+        </p:spPr>
+      </p:pic>
+    </p:spTree>
+    <p:extLst>
+      <p:ext uri="{BB962C8B-B14F-4D97-AF65-F5344CB8AC3E}">
+        <p14:creationId xmlns:p14="http://schemas.microsoft.com/office/powerpoint/2010/main" val="1602812427"/>
+      </p:ext>
+    </p:extLst>
+  </p:cSld>
+  <p:clrMapOvr>
+    <a:masterClrMapping/>
+  </p:clrMapOvr>
+</p:sld>
+</file>
+
+<file path=ppt/slides/slide4.xml><?xml version="1.0" encoding="utf-8"?>
+<p:sld xmlns:a="http://schemas.openxmlformats.org/drawingml/2006/main" xmlns:r="http://schemas.openxmlformats.org/officeDocument/2006/relationships" xmlns:p="http://schemas.openxmlformats.org/presentationml/2006/main">
+  <p:cSld>
+    <p:spTree>
+      <p:nvGrpSpPr>
+        <p:cNvPr id="1" name=""/>
+        <p:cNvGrpSpPr/>
+        <p:nvPr/>
+      </p:nvGrpSpPr>
+      <p:grpSpPr>
+        <a:xfrm>
+          <a:off x="0" y="0"/>
+          <a:ext cx="0" cy="0"/>
+          <a:chOff x="0" y="0"/>
+          <a:chExt cx="0" cy="0"/>
+        </a:xfrm>
+      </p:grpSpPr>
+      <p:pic>
+        <p:nvPicPr>
+          <p:cNvPr id="4" name="Imagen 3"/>
+          <p:cNvPicPr>
+            <a:picLocks noChangeAspect="1"/>
+          </p:cNvPicPr>
+          <p:nvPr/>
+        </p:nvPicPr>
+        <p:blipFill rotWithShape="1">
+          <a:blip r:embed="rId2"/>
+          <a:srcRect l="15040" t="6696" r="25806" b="24196"/>
+          <a:stretch/>
+        </p:blipFill>
+        <p:spPr>
+          <a:xfrm>
+            <a:off x="1532585" y="579550"/>
+            <a:ext cx="8113690" cy="5924282"/>
+          </a:xfrm>
+          <a:prstGeom prst="rect">
+            <a:avLst/>
+          </a:prstGeom>
+        </p:spPr>
+      </p:pic>
+    </p:spTree>
+    <p:extLst>
+      <p:ext uri="{BB962C8B-B14F-4D97-AF65-F5344CB8AC3E}">
+        <p14:creationId xmlns:p14="http://schemas.microsoft.com/office/powerpoint/2010/main" val="2231765216"/>
+      </p:ext>
+    </p:extLst>
+  </p:cSld>
+  <p:clrMapOvr>
+    <a:masterClrMapping/>
+  </p:clrMapOvr>
+</p:sld>
+</file>
+
 <file path=ppt/theme/theme1.xml><?xml version="1.0" encoding="utf-8"?>
 <a:theme xmlns:a="http://schemas.openxmlformats.org/drawingml/2006/main" name="Tema de Office">
   <a:themeElements>

</xml_diff>